<commit_message>
modified:   exo3_1-11.pdf modified:   exo3_1-11.pptx
</commit_message>
<xml_diff>
--- a/ppt/Exodus/exo3_1-11.pptx
+++ b/ppt/Exodus/exo3_1-11.pptx
@@ -231,7 +231,7 @@
           <a:p>
             <a:fld id="{3EFD42F7-718C-4B98-AAEC-167E6DDD60A7}" type="datetimeFigureOut">
               <a:rPr lang="en-US" smtClean="0"/>
-              <a:t>8/11/25</a:t>
+              <a:t>8/12/25</a:t>
             </a:fld>
             <a:endParaRPr lang="en-US"/>
           </a:p>
@@ -727,7 +727,7 @@
           <a:p>
             <a:fld id="{63A1C593-65D0-4073-BCC9-577B9352EA97}" type="datetimeFigureOut">
               <a:rPr lang="en-US" smtClean="0"/>
-              <a:t>8/11/25</a:t>
+              <a:t>8/12/25</a:t>
             </a:fld>
             <a:endParaRPr lang="en-US"/>
           </a:p>
@@ -973,7 +973,7 @@
           <a:p>
             <a:fld id="{63A1C593-65D0-4073-BCC9-577B9352EA97}" type="datetimeFigureOut">
               <a:rPr lang="en-US" smtClean="0"/>
-              <a:t>8/11/25</a:t>
+              <a:t>8/12/25</a:t>
             </a:fld>
             <a:endParaRPr lang="en-US"/>
           </a:p>
@@ -1147,7 +1147,7 @@
           <a:p>
             <a:fld id="{63A1C593-65D0-4073-BCC9-577B9352EA97}" type="datetimeFigureOut">
               <a:rPr lang="en-US" smtClean="0"/>
-              <a:t>8/11/25</a:t>
+              <a:t>8/12/25</a:t>
             </a:fld>
             <a:endParaRPr lang="en-US"/>
           </a:p>
@@ -1474,7 +1474,7 @@
           <a:p>
             <a:fld id="{63A1C593-65D0-4073-BCC9-577B9352EA97}" type="datetimeFigureOut">
               <a:rPr lang="en-US" smtClean="0"/>
-              <a:t>8/11/25</a:t>
+              <a:t>8/12/25</a:t>
             </a:fld>
             <a:endParaRPr lang="en-US"/>
           </a:p>
@@ -1661,7 +1661,7 @@
           <a:p>
             <a:fld id="{63A1C593-65D0-4073-BCC9-577B9352EA97}" type="datetimeFigureOut">
               <a:rPr lang="en-US" smtClean="0"/>
-              <a:t>8/11/25</a:t>
+              <a:t>8/12/25</a:t>
             </a:fld>
             <a:endParaRPr lang="en-US"/>
           </a:p>
@@ -1886,7 +1886,7 @@
           <a:p>
             <a:fld id="{63A1C593-65D0-4073-BCC9-577B9352EA97}" type="datetimeFigureOut">
               <a:rPr lang="en-US" smtClean="0"/>
-              <a:t>8/11/25</a:t>
+              <a:t>8/12/25</a:t>
             </a:fld>
             <a:endParaRPr lang="en-US"/>
           </a:p>
@@ -2246,7 +2246,7 @@
           <a:p>
             <a:fld id="{63A1C593-65D0-4073-BCC9-577B9352EA97}" type="datetimeFigureOut">
               <a:rPr lang="en-US" smtClean="0"/>
-              <a:t>8/11/25</a:t>
+              <a:t>8/12/25</a:t>
             </a:fld>
             <a:endParaRPr lang="en-US"/>
           </a:p>
@@ -2359,7 +2359,7 @@
           <a:p>
             <a:fld id="{63A1C593-65D0-4073-BCC9-577B9352EA97}" type="datetimeFigureOut">
               <a:rPr lang="en-US" smtClean="0"/>
-              <a:t>8/11/25</a:t>
+              <a:t>8/12/25</a:t>
             </a:fld>
             <a:endParaRPr lang="en-US"/>
           </a:p>
@@ -2450,7 +2450,7 @@
           <a:p>
             <a:fld id="{63A1C593-65D0-4073-BCC9-577B9352EA97}" type="datetimeFigureOut">
               <a:rPr lang="en-US" smtClean="0"/>
-              <a:t>8/11/25</a:t>
+              <a:t>8/12/25</a:t>
             </a:fld>
             <a:endParaRPr lang="en-US"/>
           </a:p>
@@ -2721,7 +2721,7 @@
           <a:p>
             <a:fld id="{63A1C593-65D0-4073-BCC9-577B9352EA97}" type="datetimeFigureOut">
               <a:rPr lang="en-US" smtClean="0"/>
-              <a:t>8/11/25</a:t>
+              <a:t>8/12/25</a:t>
             </a:fld>
             <a:endParaRPr lang="en-US"/>
           </a:p>
@@ -2998,7 +2998,7 @@
           <a:p>
             <a:fld id="{63A1C593-65D0-4073-BCC9-577B9352EA97}" type="datetimeFigureOut">
               <a:rPr lang="en-US" smtClean="0"/>
-              <a:t>8/11/25</a:t>
+              <a:t>8/12/25</a:t>
             </a:fld>
             <a:endParaRPr lang="en-US"/>
           </a:p>
@@ -3268,7 +3268,7 @@
           <a:p>
             <a:fld id="{63A1C593-65D0-4073-BCC9-577B9352EA97}" type="datetimeFigureOut">
               <a:rPr lang="en-US" smtClean="0"/>
-              <a:t>8/11/25</a:t>
+              <a:t>8/12/25</a:t>
             </a:fld>
             <a:endParaRPr lang="en-US"/>
           </a:p>
@@ -4075,8 +4075,8 @@
         </p:nvSpPr>
         <p:spPr>
           <a:xfrm>
-            <a:off x="492369" y="4600087"/>
-            <a:ext cx="5036820" cy="577215"/>
+            <a:off x="114416" y="4310134"/>
+            <a:ext cx="5359791" cy="386441"/>
           </a:xfrm>
           <a:prstGeom prst="rect">
             <a:avLst/>
@@ -4148,6 +4148,302 @@
           </a:prstGeom>
         </p:spPr>
       </p:pic>
+      <p:graphicFrame>
+        <p:nvGraphicFramePr>
+          <p:cNvPr id="5" name="Table 4">
+            <a:extLst>
+              <a:ext uri="{FF2B5EF4-FFF2-40B4-BE49-F238E27FC236}">
+                <a16:creationId xmlns:a16="http://schemas.microsoft.com/office/drawing/2014/main" id="{C478FF19-77F3-D465-9E6C-9EE2D0285A0D}"/>
+              </a:ext>
+            </a:extLst>
+          </p:cNvPr>
+          <p:cNvGraphicFramePr>
+            <a:graphicFrameLocks noGrp="1"/>
+          </p:cNvGraphicFramePr>
+          <p:nvPr>
+            <p:extLst>
+              <p:ext uri="{D42A27DB-BD31-4B8C-83A1-F6EECF244321}">
+                <p14:modId xmlns:p14="http://schemas.microsoft.com/office/powerpoint/2010/main" val="2314182030"/>
+              </p:ext>
+            </p:extLst>
+          </p:nvPr>
+        </p:nvGraphicFramePr>
+        <p:xfrm>
+          <a:off x="114416" y="4847304"/>
+          <a:ext cx="6276071" cy="1854200"/>
+        </p:xfrm>
+        <a:graphic>
+          <a:graphicData uri="http://schemas.openxmlformats.org/drawingml/2006/table">
+            <a:tbl>
+              <a:tblPr firstRow="1" bandRow="1">
+                <a:tableStyleId>{5C22544A-7EE6-4342-B048-85BDC9FD1C3A}</a:tableStyleId>
+              </a:tblPr>
+              <a:tblGrid>
+                <a:gridCol w="373380">
+                  <a:extLst>
+                    <a:ext uri="{9D8B030D-6E8A-4147-A177-3AD203B41FA5}">
+                      <a16:colId xmlns:a16="http://schemas.microsoft.com/office/drawing/2014/main" val="1040163147"/>
+                    </a:ext>
+                  </a:extLst>
+                </a:gridCol>
+                <a:gridCol w="5031182">
+                  <a:extLst>
+                    <a:ext uri="{9D8B030D-6E8A-4147-A177-3AD203B41FA5}">
+                      <a16:colId xmlns:a16="http://schemas.microsoft.com/office/drawing/2014/main" val="1627170691"/>
+                    </a:ext>
+                  </a:extLst>
+                </a:gridCol>
+                <a:gridCol w="871509">
+                  <a:extLst>
+                    <a:ext uri="{9D8B030D-6E8A-4147-A177-3AD203B41FA5}">
+                      <a16:colId xmlns:a16="http://schemas.microsoft.com/office/drawing/2014/main" val="1795012203"/>
+                    </a:ext>
+                  </a:extLst>
+                </a:gridCol>
+              </a:tblGrid>
+              <a:tr h="370840">
+                <a:tc>
+                  <a:txBody>
+                    <a:bodyPr/>
+                    <a:lstStyle/>
+                    <a:p>
+                      <a:endParaRPr lang="en-US" dirty="0"/>
+                    </a:p>
+                  </a:txBody>
+                  <a:tcPr/>
+                </a:tc>
+                <a:tc>
+                  <a:txBody>
+                    <a:bodyPr/>
+                    <a:lstStyle/>
+                    <a:p>
+                      <a:r>
+                        <a:rPr lang="en-US" dirty="0"/>
+                        <a:t>Bible Reading Exodus 3:1-11 (Optional)</a:t>
+                      </a:r>
+                    </a:p>
+                  </a:txBody>
+                  <a:tcPr/>
+                </a:tc>
+                <a:tc>
+                  <a:txBody>
+                    <a:bodyPr/>
+                    <a:lstStyle/>
+                    <a:p>
+                      <a:r>
+                        <a:rPr lang="en-US" dirty="0"/>
+                        <a:t>Time</a:t>
+                      </a:r>
+                    </a:p>
+                  </a:txBody>
+                  <a:tcPr/>
+                </a:tc>
+                <a:extLst>
+                  <a:ext uri="{0D108BD9-81ED-4DB2-BD59-A6C34878D82A}">
+                    <a16:rowId xmlns:a16="http://schemas.microsoft.com/office/drawing/2014/main" val="847334649"/>
+                  </a:ext>
+                </a:extLst>
+              </a:tr>
+              <a:tr h="370840">
+                <a:tc>
+                  <a:txBody>
+                    <a:bodyPr/>
+                    <a:lstStyle/>
+                    <a:p>
+                      <a:r>
+                        <a:rPr lang="en-US" dirty="0"/>
+                        <a:t>1</a:t>
+                      </a:r>
+                    </a:p>
+                  </a:txBody>
+                  <a:tcPr/>
+                </a:tc>
+                <a:tc>
+                  <a:txBody>
+                    <a:bodyPr/>
+                    <a:lstStyle/>
+                    <a:p>
+                      <a:r>
+                        <a:rPr lang="en-US" dirty="0">
+                          <a:hlinkClick r:id="rId3"/>
+                        </a:rPr>
+                        <a:t>CUV in Chinese or Cantonese (Audio) </a:t>
+                      </a:r>
+                      <a:endParaRPr lang="en-US" dirty="0"/>
+                    </a:p>
+                  </a:txBody>
+                  <a:tcPr/>
+                </a:tc>
+                <a:tc>
+                  <a:txBody>
+                    <a:bodyPr/>
+                    <a:lstStyle/>
+                    <a:p>
+                      <a:r>
+                        <a:rPr lang="en-US" dirty="0"/>
+                        <a:t>4 min</a:t>
+                      </a:r>
+                    </a:p>
+                  </a:txBody>
+                  <a:tcPr/>
+                </a:tc>
+                <a:extLst>
+                  <a:ext uri="{0D108BD9-81ED-4DB2-BD59-A6C34878D82A}">
+                    <a16:rowId xmlns:a16="http://schemas.microsoft.com/office/drawing/2014/main" val="3802836193"/>
+                  </a:ext>
+                </a:extLst>
+              </a:tr>
+              <a:tr h="370840">
+                <a:tc>
+                  <a:txBody>
+                    <a:bodyPr/>
+                    <a:lstStyle/>
+                    <a:p>
+                      <a:r>
+                        <a:rPr lang="en-US" dirty="0"/>
+                        <a:t>2</a:t>
+                      </a:r>
+                    </a:p>
+                  </a:txBody>
+                  <a:tcPr/>
+                </a:tc>
+                <a:tc>
+                  <a:txBody>
+                    <a:bodyPr/>
+                    <a:lstStyle/>
+                    <a:p>
+                      <a:r>
+                        <a:rPr lang="en-US" dirty="0">
+                          <a:hlinkClick r:id="rId4"/>
+                        </a:rPr>
+                        <a:t>NIV Bible Reading in English (Audio)</a:t>
+                      </a:r>
+                      <a:endParaRPr lang="en-US" dirty="0"/>
+                    </a:p>
+                  </a:txBody>
+                  <a:tcPr/>
+                </a:tc>
+                <a:tc>
+                  <a:txBody>
+                    <a:bodyPr/>
+                    <a:lstStyle/>
+                    <a:p>
+                      <a:r>
+                        <a:rPr lang="en-US" dirty="0"/>
+                        <a:t>4 min</a:t>
+                      </a:r>
+                    </a:p>
+                  </a:txBody>
+                  <a:tcPr/>
+                </a:tc>
+                <a:extLst>
+                  <a:ext uri="{0D108BD9-81ED-4DB2-BD59-A6C34878D82A}">
+                    <a16:rowId xmlns:a16="http://schemas.microsoft.com/office/drawing/2014/main" val="1486004473"/>
+                  </a:ext>
+                </a:extLst>
+              </a:tr>
+              <a:tr h="370840">
+                <a:tc>
+                  <a:txBody>
+                    <a:bodyPr/>
+                    <a:lstStyle/>
+                    <a:p>
+                      <a:r>
+                        <a:rPr lang="en-US" dirty="0"/>
+                        <a:t>3</a:t>
+                      </a:r>
+                    </a:p>
+                  </a:txBody>
+                  <a:tcPr/>
+                </a:tc>
+                <a:tc>
+                  <a:txBody>
+                    <a:bodyPr/>
+                    <a:lstStyle/>
+                    <a:p>
+                      <a:r>
+                        <a:rPr lang="en-US" dirty="0">
+                          <a:hlinkClick r:id="rId5"/>
+                        </a:rPr>
+                        <a:t>Moses &amp; Burning Bush English (ChildrenVideo)</a:t>
+                      </a:r>
+                      <a:endParaRPr lang="en-US" dirty="0"/>
+                    </a:p>
+                  </a:txBody>
+                  <a:tcPr/>
+                </a:tc>
+                <a:tc>
+                  <a:txBody>
+                    <a:bodyPr/>
+                    <a:lstStyle/>
+                    <a:p>
+                      <a:r>
+                        <a:rPr lang="en-US" dirty="0"/>
+                        <a:t>3 min</a:t>
+                      </a:r>
+                    </a:p>
+                  </a:txBody>
+                  <a:tcPr/>
+                </a:tc>
+                <a:extLst>
+                  <a:ext uri="{0D108BD9-81ED-4DB2-BD59-A6C34878D82A}">
+                    <a16:rowId xmlns:a16="http://schemas.microsoft.com/office/drawing/2014/main" val="2823025288"/>
+                  </a:ext>
+                </a:extLst>
+              </a:tr>
+              <a:tr h="370840">
+                <a:tc>
+                  <a:txBody>
+                    <a:bodyPr/>
+                    <a:lstStyle/>
+                    <a:p>
+                      <a:r>
+                        <a:rPr lang="en-US" dirty="0"/>
+                        <a:t>4</a:t>
+                      </a:r>
+                    </a:p>
+                  </a:txBody>
+                  <a:tcPr/>
+                </a:tc>
+                <a:tc>
+                  <a:txBody>
+                    <a:bodyPr/>
+                    <a:lstStyle/>
+                    <a:p>
+                      <a:r>
+                        <a:rPr lang="en-US" dirty="0">
+                          <a:hlinkClick r:id="rId6"/>
+                        </a:rPr>
+                        <a:t>Chinese Video</a:t>
+                      </a:r>
+                      <a:endParaRPr lang="en-US" dirty="0"/>
+                    </a:p>
+                  </a:txBody>
+                  <a:tcPr/>
+                </a:tc>
+                <a:tc>
+                  <a:txBody>
+                    <a:bodyPr/>
+                    <a:lstStyle/>
+                    <a:p>
+                      <a:r>
+                        <a:rPr lang="en-US" dirty="0"/>
+                        <a:t>6 min</a:t>
+                      </a:r>
+                    </a:p>
+                  </a:txBody>
+                  <a:tcPr/>
+                </a:tc>
+                <a:extLst>
+                  <a:ext uri="{0D108BD9-81ED-4DB2-BD59-A6C34878D82A}">
+                    <a16:rowId xmlns:a16="http://schemas.microsoft.com/office/drawing/2014/main" val="4250529531"/>
+                  </a:ext>
+                </a:extLst>
+              </a:tr>
+            </a:tbl>
+          </a:graphicData>
+        </a:graphic>
+      </p:graphicFrame>
     </p:spTree>
   </p:cSld>
   <p:clrMapOvr>
@@ -4772,96 +5068,44 @@
           <a:chExt cx="0" cy="0"/>
         </a:xfrm>
       </p:grpSpPr>
-      <p:sp>
-        <p:nvSpPr>
-          <p:cNvPr id="3" name="Content Placeholder 2"/>
-          <p:cNvSpPr>
-            <a:spLocks noGrp="1"/>
-          </p:cNvSpPr>
+      <p:pic>
+        <p:nvPicPr>
+          <p:cNvPr id="5" name="Content Placeholder 4">
+            <a:extLst>
+              <a:ext uri="{FF2B5EF4-FFF2-40B4-BE49-F238E27FC236}">
+                <a16:creationId xmlns:a16="http://schemas.microsoft.com/office/drawing/2014/main" id="{5321290E-757A-405A-8B4E-FF51E801F18E}"/>
+              </a:ext>
+            </a:extLst>
+          </p:cNvPr>
+          <p:cNvPicPr>
+            <a:picLocks noGrp="1" noChangeAspect="1"/>
+          </p:cNvPicPr>
           <p:nvPr>
             <p:ph idx="1"/>
           </p:nvPr>
-        </p:nvSpPr>
+        </p:nvPicPr>
+        <p:blipFill>
+          <a:blip r:embed="rId2">
+            <a:extLst>
+              <a:ext uri="{28A0092B-C50C-407E-A947-70E740481C1C}">
+                <a14:useLocalDpi xmlns:a14="http://schemas.microsoft.com/office/drawing/2010/main" val="0"/>
+              </a:ext>
+            </a:extLst>
+          </a:blip>
+          <a:stretch>
+            <a:fillRect/>
+          </a:stretch>
+        </p:blipFill>
         <p:spPr>
           <a:xfrm>
-            <a:off x="609600" y="5064387"/>
-            <a:ext cx="1617980" cy="1459523"/>
+            <a:off x="51581" y="5064386"/>
+            <a:ext cx="2247900" cy="1841500"/>
           </a:xfrm>
-          <a:solidFill>
-            <a:schemeClr val="tx1">
-              <a:lumMod val="50000"/>
-              <a:lumOff val="50000"/>
-            </a:schemeClr>
-          </a:solidFill>
+          <a:prstGeom prst="rect">
+            <a:avLst/>
+          </a:prstGeom>
         </p:spPr>
-        <p:txBody>
-          <a:bodyPr lIns="91440" tIns="274320"/>
-          <a:lstStyle/>
-          <a:p>
-            <a:pPr marL="0" indent="0" algn="ctr">
-              <a:buNone/>
-            </a:pPr>
-            <a:r>
-              <a:rPr lang="en-US" altLang="zh-CN" sz="2600" dirty="0"/>
-              <a:t> </a:t>
-            </a:r>
-            <a:r>
-              <a:rPr lang="en-US" altLang="zh-CN" sz="2600" dirty="0">
-                <a:solidFill>
-                  <a:schemeClr val="bg1"/>
-                </a:solidFill>
-              </a:rPr>
-              <a:t>Moses</a:t>
-            </a:r>
-            <a:br>
-              <a:rPr lang="en-US" altLang="zh-CN" sz="2600" dirty="0">
-                <a:solidFill>
-                  <a:schemeClr val="bg1"/>
-                </a:solidFill>
-              </a:rPr>
-            </a:br>
-            <a:r>
-              <a:rPr lang="zh-CN" altLang="en-US" sz="2800" dirty="0">
-                <a:solidFill>
-                  <a:schemeClr val="bg1"/>
-                </a:solidFill>
-                <a:sym typeface="+mn-ea"/>
-              </a:rPr>
-              <a:t>摩西</a:t>
-            </a:r>
-            <a:endParaRPr lang="en-US" altLang="zh-CN" sz="2800" dirty="0">
-              <a:solidFill>
-                <a:schemeClr val="bg1"/>
-              </a:solidFill>
-              <a:sym typeface="+mn-ea"/>
-            </a:endParaRPr>
-          </a:p>
-          <a:p>
-            <a:pPr marL="0" indent="0">
-              <a:buNone/>
-            </a:pPr>
-            <a:endParaRPr lang="zh-CN" altLang="en-US" sz="2600" dirty="0"/>
-          </a:p>
-          <a:p>
-            <a:pPr marL="0" indent="0">
-              <a:buNone/>
-            </a:pPr>
-            <a:endParaRPr lang="zh-CN" altLang="en-US" sz="2200" dirty="0"/>
-          </a:p>
-          <a:p>
-            <a:pPr marL="0" indent="0">
-              <a:buNone/>
-            </a:pPr>
-            <a:endParaRPr lang="zh-CN" altLang="en-US" sz="2200" dirty="0"/>
-          </a:p>
-          <a:p>
-            <a:pPr marL="0" indent="0">
-              <a:buNone/>
-            </a:pPr>
-            <a:endParaRPr lang="zh-CN" altLang="en-US" sz="2200" dirty="0"/>
-          </a:p>
-        </p:txBody>
-      </p:sp>
+      </p:pic>
       <p:sp>
         <p:nvSpPr>
           <p:cNvPr id="6" name="Text Box 4">
@@ -4925,256 +5169,6 @@
               <a:latin typeface="PMingLiU"/>
               <a:ea typeface="PMingLiU"/>
             </a:endParaRPr>
-          </a:p>
-        </p:txBody>
-      </p:sp>
-      <p:sp>
-        <p:nvSpPr>
-          <p:cNvPr id="8" name="Content Placeholder 2">
-            <a:extLst>
-              <a:ext uri="{FF2B5EF4-FFF2-40B4-BE49-F238E27FC236}">
-                <a16:creationId xmlns:a16="http://schemas.microsoft.com/office/drawing/2014/main" id="{588FD68E-2116-0BB4-066E-8871FD5888E8}"/>
-              </a:ext>
-            </a:extLst>
-          </p:cNvPr>
-          <p:cNvSpPr txBox="1">
-            <a:spLocks/>
-          </p:cNvSpPr>
-          <p:nvPr/>
-        </p:nvSpPr>
-        <p:spPr>
-          <a:xfrm>
-            <a:off x="9827480" y="5064387"/>
-            <a:ext cx="1617980" cy="1459523"/>
-          </a:xfrm>
-          <a:prstGeom prst="rect">
-            <a:avLst/>
-          </a:prstGeom>
-          <a:solidFill>
-            <a:schemeClr val="tx1">
-              <a:lumMod val="50000"/>
-              <a:lumOff val="50000"/>
-            </a:schemeClr>
-          </a:solidFill>
-          <a:ln w="9525">
-            <a:noFill/>
-          </a:ln>
-        </p:spPr>
-        <p:txBody>
-          <a:bodyPr tIns="182880"/>
-          <a:lstStyle>
-            <a:lvl1pPr marL="342900" indent="-342900" algn="l" rtl="0" fontAlgn="base">
-              <a:spcBef>
-                <a:spcPct val="20000"/>
-              </a:spcBef>
-              <a:spcAft>
-                <a:spcPct val="0"/>
-              </a:spcAft>
-              <a:buChar char="•"/>
-              <a:defRPr sz="3200" kern="1200">
-                <a:solidFill>
-                  <a:schemeClr val="tx1"/>
-                </a:solidFill>
-                <a:latin typeface="+mn-lt"/>
-                <a:ea typeface="+mn-ea"/>
-                <a:cs typeface="+mn-cs"/>
-              </a:defRPr>
-            </a:lvl1pPr>
-            <a:lvl2pPr marL="742950" indent="-285750" algn="l" rtl="0" fontAlgn="base">
-              <a:spcBef>
-                <a:spcPct val="20000"/>
-              </a:spcBef>
-              <a:spcAft>
-                <a:spcPct val="0"/>
-              </a:spcAft>
-              <a:buChar char="–"/>
-              <a:defRPr sz="2800" kern="1200">
-                <a:solidFill>
-                  <a:schemeClr val="tx1"/>
-                </a:solidFill>
-                <a:latin typeface="+mn-lt"/>
-                <a:ea typeface="+mn-ea"/>
-                <a:cs typeface="+mn-cs"/>
-              </a:defRPr>
-            </a:lvl2pPr>
-            <a:lvl3pPr marL="1143000" indent="-228600" algn="l" rtl="0" fontAlgn="base">
-              <a:spcBef>
-                <a:spcPct val="20000"/>
-              </a:spcBef>
-              <a:spcAft>
-                <a:spcPct val="0"/>
-              </a:spcAft>
-              <a:buChar char="•"/>
-              <a:defRPr sz="2400" kern="1200">
-                <a:solidFill>
-                  <a:schemeClr val="tx1"/>
-                </a:solidFill>
-                <a:latin typeface="+mn-lt"/>
-                <a:ea typeface="+mn-ea"/>
-                <a:cs typeface="+mn-cs"/>
-              </a:defRPr>
-            </a:lvl3pPr>
-            <a:lvl4pPr marL="1600200" indent="-228600" algn="l" rtl="0" fontAlgn="base">
-              <a:spcBef>
-                <a:spcPct val="20000"/>
-              </a:spcBef>
-              <a:spcAft>
-                <a:spcPct val="0"/>
-              </a:spcAft>
-              <a:buChar char="–"/>
-              <a:defRPr sz="2000" kern="1200">
-                <a:solidFill>
-                  <a:schemeClr val="tx1"/>
-                </a:solidFill>
-                <a:latin typeface="+mn-lt"/>
-                <a:ea typeface="+mn-ea"/>
-                <a:cs typeface="+mn-cs"/>
-              </a:defRPr>
-            </a:lvl4pPr>
-            <a:lvl5pPr marL="2057400" indent="-228600" algn="l" rtl="0" fontAlgn="base">
-              <a:spcBef>
-                <a:spcPct val="20000"/>
-              </a:spcBef>
-              <a:spcAft>
-                <a:spcPct val="0"/>
-              </a:spcAft>
-              <a:buChar char="»"/>
-              <a:defRPr sz="2000" kern="1200">
-                <a:solidFill>
-                  <a:schemeClr val="tx1"/>
-                </a:solidFill>
-                <a:latin typeface="+mn-lt"/>
-                <a:ea typeface="+mn-ea"/>
-                <a:cs typeface="+mn-cs"/>
-              </a:defRPr>
-            </a:lvl5pPr>
-            <a:lvl6pPr marL="2514600" indent="-228600" algn="l" defTabSz="914400" rtl="0" eaLnBrk="1" latinLnBrk="0" hangingPunct="1">
-              <a:lnSpc>
-                <a:spcPct val="90000"/>
-              </a:lnSpc>
-              <a:spcBef>
-                <a:spcPts val="500"/>
-              </a:spcBef>
-              <a:buFont typeface="Arial" panose="020B0604020202020204" pitchFamily="34" charset="0"/>
-              <a:buChar char="•"/>
-              <a:defRPr sz="1800" kern="1200">
-                <a:solidFill>
-                  <a:schemeClr val="tx1"/>
-                </a:solidFill>
-                <a:latin typeface="+mn-lt"/>
-                <a:ea typeface="+mn-ea"/>
-                <a:cs typeface="+mn-cs"/>
-              </a:defRPr>
-            </a:lvl6pPr>
-            <a:lvl7pPr marL="2971800" indent="-228600" algn="l" defTabSz="914400" rtl="0" eaLnBrk="1" latinLnBrk="0" hangingPunct="1">
-              <a:lnSpc>
-                <a:spcPct val="90000"/>
-              </a:lnSpc>
-              <a:spcBef>
-                <a:spcPts val="500"/>
-              </a:spcBef>
-              <a:buFont typeface="Arial" panose="020B0604020202020204" pitchFamily="34" charset="0"/>
-              <a:buChar char="•"/>
-              <a:defRPr sz="1800" kern="1200">
-                <a:solidFill>
-                  <a:schemeClr val="tx1"/>
-                </a:solidFill>
-                <a:latin typeface="+mn-lt"/>
-                <a:ea typeface="+mn-ea"/>
-                <a:cs typeface="+mn-cs"/>
-              </a:defRPr>
-            </a:lvl7pPr>
-            <a:lvl8pPr marL="3429000" indent="-228600" algn="l" defTabSz="914400" rtl="0" eaLnBrk="1" latinLnBrk="0" hangingPunct="1">
-              <a:lnSpc>
-                <a:spcPct val="90000"/>
-              </a:lnSpc>
-              <a:spcBef>
-                <a:spcPts val="500"/>
-              </a:spcBef>
-              <a:buFont typeface="Arial" panose="020B0604020202020204" pitchFamily="34" charset="0"/>
-              <a:buChar char="•"/>
-              <a:defRPr sz="1800" kern="1200">
-                <a:solidFill>
-                  <a:schemeClr val="tx1"/>
-                </a:solidFill>
-                <a:latin typeface="+mn-lt"/>
-                <a:ea typeface="+mn-ea"/>
-                <a:cs typeface="+mn-cs"/>
-              </a:defRPr>
-            </a:lvl8pPr>
-            <a:lvl9pPr marL="3886200" indent="-228600" algn="l" defTabSz="914400" rtl="0" eaLnBrk="1" latinLnBrk="0" hangingPunct="1">
-              <a:lnSpc>
-                <a:spcPct val="90000"/>
-              </a:lnSpc>
-              <a:spcBef>
-                <a:spcPts val="500"/>
-              </a:spcBef>
-              <a:buFont typeface="Arial" panose="020B0604020202020204" pitchFamily="34" charset="0"/>
-              <a:buChar char="•"/>
-              <a:defRPr sz="1800" kern="1200">
-                <a:solidFill>
-                  <a:schemeClr val="tx1"/>
-                </a:solidFill>
-                <a:latin typeface="+mn-lt"/>
-                <a:ea typeface="+mn-ea"/>
-                <a:cs typeface="+mn-cs"/>
-              </a:defRPr>
-            </a:lvl9pPr>
-          </a:lstStyle>
-          <a:p>
-            <a:pPr algn="ctr">
-              <a:buNone/>
-            </a:pPr>
-            <a:r>
-              <a:rPr lang="en-US" altLang="zh-CN" sz="2800" dirty="0">
-                <a:solidFill>
-                  <a:schemeClr val="bg1"/>
-                </a:solidFill>
-                <a:sym typeface="+mn-ea"/>
-              </a:rPr>
-              <a:t>Israelites</a:t>
-            </a:r>
-          </a:p>
-          <a:p>
-            <a:pPr algn="ctr">
-              <a:buNone/>
-            </a:pPr>
-            <a:r>
-              <a:rPr lang="zh-CN" altLang="en-US" sz="2400" dirty="0">
-                <a:solidFill>
-                  <a:schemeClr val="bg1"/>
-                </a:solidFill>
-                <a:sym typeface="+mn-ea"/>
-              </a:rPr>
-              <a:t>以色列人</a:t>
-            </a:r>
-            <a:endParaRPr lang="en-US" altLang="en-US" sz="2800" dirty="0">
-              <a:solidFill>
-                <a:schemeClr val="bg1"/>
-              </a:solidFill>
-              <a:sym typeface="+mn-ea"/>
-            </a:endParaRPr>
-          </a:p>
-          <a:p>
-            <a:pPr marL="0" indent="0">
-              <a:buFontTx/>
-              <a:buNone/>
-            </a:pPr>
-            <a:endParaRPr lang="zh-CN" altLang="en-US" sz="2600" dirty="0"/>
-          </a:p>
-          <a:p>
-            <a:pPr marL="0" indent="0">
-              <a:buFontTx/>
-              <a:buNone/>
-            </a:pPr>
-            <a:endParaRPr lang="zh-CN" altLang="en-US" sz="2200" dirty="0"/>
-          </a:p>
-          <a:p>
-            <a:pPr marL="0" indent="0">
-              <a:buFontTx/>
-              <a:buNone/>
-            </a:pPr>
-            <a:endParaRPr lang="zh-CN" altLang="en-US" sz="2200" dirty="0"/>
           </a:p>
         </p:txBody>
       </p:sp>
@@ -5923,15 +5917,13 @@
           </p:cNvPr>
           <p:cNvCxnSpPr>
             <a:cxnSpLocks/>
-            <a:stCxn id="3" idx="3"/>
-            <a:endCxn id="8" idx="1"/>
           </p:cNvCxnSpPr>
           <p:nvPr/>
         </p:nvCxnSpPr>
         <p:spPr bwMode="auto">
-          <a:xfrm>
-            <a:off x="2227580" y="5794149"/>
-            <a:ext cx="7599900" cy="0"/>
+          <a:xfrm flipV="1">
+            <a:off x="2407431" y="6137320"/>
+            <a:ext cx="7590412" cy="23183"/>
           </a:xfrm>
           <a:prstGeom prst="line">
             <a:avLst/>
@@ -6111,7 +6103,7 @@
         <p:spPr bwMode="auto">
           <a:xfrm>
             <a:off x="764771" y="4171187"/>
-            <a:ext cx="432262" cy="893199"/>
+            <a:ext cx="0" cy="893199"/>
           </a:xfrm>
           <a:prstGeom prst="line">
             <a:avLst/>
@@ -6185,6 +6177,120 @@
           </a:fontRef>
         </p:style>
       </p:cxnSp>
+      <p:sp>
+        <p:nvSpPr>
+          <p:cNvPr id="11" name="TextBox 10">
+            <a:extLst>
+              <a:ext uri="{FF2B5EF4-FFF2-40B4-BE49-F238E27FC236}">
+                <a16:creationId xmlns:a16="http://schemas.microsoft.com/office/drawing/2014/main" id="{BCFE7092-0B33-8B0A-08F9-4BE74A255C49}"/>
+              </a:ext>
+            </a:extLst>
+          </p:cNvPr>
+          <p:cNvSpPr txBox="1"/>
+          <p:nvPr/>
+        </p:nvSpPr>
+        <p:spPr>
+          <a:xfrm>
+            <a:off x="1168425" y="6391732"/>
+            <a:ext cx="1119892" cy="461665"/>
+          </a:xfrm>
+          <a:prstGeom prst="rect">
+            <a:avLst/>
+          </a:prstGeom>
+          <a:noFill/>
+        </p:spPr>
+        <p:txBody>
+          <a:bodyPr wrap="square" rtlCol="0">
+            <a:spAutoFit/>
+          </a:bodyPr>
+          <a:lstStyle/>
+          <a:p>
+            <a:r>
+              <a:rPr lang="en-US" sz="2400" dirty="0"/>
+              <a:t>Moses</a:t>
+            </a:r>
+          </a:p>
+        </p:txBody>
+      </p:sp>
+      <p:pic>
+        <p:nvPicPr>
+          <p:cNvPr id="15" name="Picture 14">
+            <a:hlinkClick r:id="rId3"/>
+            <a:extLst>
+              <a:ext uri="{FF2B5EF4-FFF2-40B4-BE49-F238E27FC236}">
+                <a16:creationId xmlns:a16="http://schemas.microsoft.com/office/drawing/2014/main" id="{C2A33040-0C2D-BFF5-0C6F-5E78D571C0C8}"/>
+              </a:ext>
+            </a:extLst>
+          </p:cNvPr>
+          <p:cNvPicPr>
+            <a:picLocks noChangeAspect="1"/>
+          </p:cNvPicPr>
+          <p:nvPr/>
+        </p:nvPicPr>
+        <p:blipFill>
+          <a:blip r:embed="rId4">
+            <a:extLst>
+              <a:ext uri="{28A0092B-C50C-407E-A947-70E740481C1C}">
+                <a14:useLocalDpi xmlns:a14="http://schemas.microsoft.com/office/drawing/2010/main" val="0"/>
+              </a:ext>
+            </a:extLst>
+          </a:blip>
+          <a:stretch>
+            <a:fillRect/>
+          </a:stretch>
+        </p:blipFill>
+        <p:spPr>
+          <a:xfrm>
+            <a:off x="9997843" y="5076160"/>
+            <a:ext cx="1665732" cy="1742317"/>
+          </a:xfrm>
+          <a:prstGeom prst="rect">
+            <a:avLst/>
+          </a:prstGeom>
+        </p:spPr>
+      </p:pic>
+      <p:sp>
+        <p:nvSpPr>
+          <p:cNvPr id="17" name="TextBox 16">
+            <a:extLst>
+              <a:ext uri="{FF2B5EF4-FFF2-40B4-BE49-F238E27FC236}">
+                <a16:creationId xmlns:a16="http://schemas.microsoft.com/office/drawing/2014/main" id="{F9C02ECB-73F8-F5E2-E257-82B58358D513}"/>
+              </a:ext>
+            </a:extLst>
+          </p:cNvPr>
+          <p:cNvSpPr txBox="1"/>
+          <p:nvPr/>
+        </p:nvSpPr>
+        <p:spPr>
+          <a:xfrm>
+            <a:off x="9898051" y="4701997"/>
+            <a:ext cx="2134418" cy="369332"/>
+          </a:xfrm>
+          <a:prstGeom prst="rect">
+            <a:avLst/>
+          </a:prstGeom>
+          <a:noFill/>
+        </p:spPr>
+        <p:txBody>
+          <a:bodyPr wrap="square" rtlCol="0">
+            <a:spAutoFit/>
+          </a:bodyPr>
+          <a:lstStyle/>
+          <a:p>
+            <a:r>
+              <a:rPr lang="en-US" dirty="0"/>
+              <a:t>Israelites</a:t>
+            </a:r>
+            <a:r>
+              <a:rPr lang="zh-CN" altLang="en-US" sz="1800" b="1" dirty="0">
+                <a:sym typeface="+mn-ea"/>
+              </a:rPr>
+              <a:t>以色列人</a:t>
+            </a:r>
+            <a:endParaRPr lang="en-US" dirty="0"/>
+          </a:p>
+        </p:txBody>
+      </p:sp>
     </p:spTree>
   </p:cSld>
   <p:clrMapOvr>
@@ -6223,7 +6329,7 @@
             </p:custDataLst>
             <p:extLst>
               <p:ext uri="{D42A27DB-BD31-4B8C-83A1-F6EECF244321}">
-                <p14:modId xmlns:p14="http://schemas.microsoft.com/office/powerpoint/2010/main" val="2359330400"/>
+                <p14:modId xmlns:p14="http://schemas.microsoft.com/office/powerpoint/2010/main" val="1113072330"/>
               </p:ext>
             </p:extLst>
           </p:nvPr>
@@ -6279,12 +6385,6 @@
                       <a:pPr algn="l">
                         <a:buNone/>
                       </a:pPr>
-                      <a:endParaRPr lang="en-US" altLang="ja-JP" sz="2800" dirty="0"/>
-                    </a:p>
-                    <a:p>
-                      <a:pPr algn="l">
-                        <a:buNone/>
-                      </a:pPr>
                       <a:r>
                         <a:rPr lang="en-US" sz="2800" i="1" dirty="0"/>
                         <a:t>When the Lord saw that he had gone over to look, God called to him from within the bush, “Moses! Moses!” And Moses said, “Here I am.” (Exo3:4 NIV)</a:t>
@@ -6336,6 +6436,27 @@
                         <a:buNone/>
                       </a:pPr>
                       <a:endParaRPr lang="en-US" sz="2800" dirty="0"/>
+                    </a:p>
+                    <a:p>
+                      <a:pPr algn="l">
+                        <a:buNone/>
+                      </a:pPr>
+                      <a:endParaRPr lang="en-US" sz="2800" dirty="0"/>
+                    </a:p>
+                    <a:p>
+                      <a:pPr algn="l">
+                        <a:buNone/>
+                      </a:pPr>
+                      <a:endParaRPr lang="en-US" sz="2800" dirty="0"/>
+                    </a:p>
+                    <a:p>
+                      <a:pPr algn="l">
+                        <a:buNone/>
+                      </a:pPr>
+                      <a:r>
+                        <a:rPr lang="en-US" sz="2000" dirty="0"/>
+                        <a:t>A). for fun. B). important. C). Moses cannot hear. D). urgent </a:t>
+                      </a:r>
                     </a:p>
                   </a:txBody>
                   <a:tcPr marL="137160" marR="137160" marT="137160" marB="137160"/>
@@ -7350,7 +7471,7 @@
             </p:custDataLst>
             <p:extLst>
               <p:ext uri="{D42A27DB-BD31-4B8C-83A1-F6EECF244321}">
-                <p14:modId xmlns:p14="http://schemas.microsoft.com/office/powerpoint/2010/main" val="1158661151"/>
+                <p14:modId xmlns:p14="http://schemas.microsoft.com/office/powerpoint/2010/main" val="898254461"/>
               </p:ext>
             </p:extLst>
           </p:nvPr>
@@ -7412,7 +7533,19 @@
                       </a:r>
                       <a:r>
                         <a:rPr lang="en-US" sz="2800" dirty="0"/>
-                        <a:t>the Glorious Lord, the Creator, and Sovereign of all things. Thank you for your mercy and grace. Thank you for calling us, the parents. Thank you for giving us, the parents, the educational authority. Our children are your heritage. We are the sinners; we do not deserve it. May Your Holy Spirit call us, guide us. Bless our children and young generation to be able to know you, follow you to be the devotional generation. May your name be glorified, generation by generation, and forever. I pray in the name of Jesus. Amen.  </a:t>
+                        <a:t>the Glorious Lord, the Creator, and Sovereign of all things. Thank you for your mercy and grace. Thank you for calling us, the parents. Thank you for giving us, the parents, the educational authority. Our </a:t>
+                      </a:r>
+                      <a:r>
+                        <a:rPr lang="en-US" sz="2800" dirty="0">
+                          <a:solidFill>
+                            <a:schemeClr val="dk1"/>
+                          </a:solidFill>
+                        </a:rPr>
+                        <a:t>children</a:t>
+                      </a:r>
+                      <a:r>
+                        <a:rPr lang="en-US" sz="2800" dirty="0"/>
+                        <a:t> are your heritage. We are the sinners; we do not deserve it. May Your Holy Spirit call us, guide us. Bless our children and young generation to be able to know you, follow you to be the devotional generation. May your name be glorified, generation by generation, and forever. I pray in the name of Jesus. Amen.  </a:t>
                       </a:r>
                       <a:endParaRPr lang="en-US" sz="2800" i="1" dirty="0"/>
                     </a:p>
@@ -7429,6 +7562,43 @@
           </a:graphicData>
         </a:graphic>
       </p:graphicFrame>
+      <p:pic>
+        <p:nvPicPr>
+          <p:cNvPr id="3" name="Picture 2">
+            <a:hlinkClick r:id="rId3"/>
+            <a:extLst>
+              <a:ext uri="{FF2B5EF4-FFF2-40B4-BE49-F238E27FC236}">
+                <a16:creationId xmlns:a16="http://schemas.microsoft.com/office/drawing/2014/main" id="{B817F010-9E85-6FEA-2554-BB7CCB7ECFF5}"/>
+              </a:ext>
+            </a:extLst>
+          </p:cNvPr>
+          <p:cNvPicPr>
+            <a:picLocks noChangeAspect="1"/>
+          </p:cNvPicPr>
+          <p:nvPr/>
+        </p:nvPicPr>
+        <p:blipFill>
+          <a:blip r:embed="rId4">
+            <a:extLst>
+              <a:ext uri="{28A0092B-C50C-407E-A947-70E740481C1C}">
+                <a14:useLocalDpi xmlns:a14="http://schemas.microsoft.com/office/drawing/2010/main" val="0"/>
+              </a:ext>
+            </a:extLst>
+          </a:blip>
+          <a:stretch>
+            <a:fillRect/>
+          </a:stretch>
+        </p:blipFill>
+        <p:spPr>
+          <a:xfrm>
+            <a:off x="10358902" y="4901185"/>
+            <a:ext cx="1695076" cy="1956815"/>
+          </a:xfrm>
+          <a:prstGeom prst="rect">
+            <a:avLst/>
+          </a:prstGeom>
+        </p:spPr>
+      </p:pic>
     </p:spTree>
     <p:extLst>
       <p:ext uri="{BB962C8B-B14F-4D97-AF65-F5344CB8AC3E}">
@@ -7514,7 +7684,7 @@
         <p:spPr>
           <a:xfrm>
             <a:off x="458470" y="2784108"/>
-            <a:ext cx="5203191" cy="2308324"/>
+            <a:ext cx="5203191" cy="4893647"/>
           </a:xfrm>
           <a:prstGeom prst="rect">
             <a:avLst/>
@@ -7534,8 +7704,18 @@
               <a:rPr lang="en-US" altLang="en-US" sz="2400" dirty="0">
                 <a:sym typeface="+mn-ea"/>
               </a:rPr>
-              <a:t>2.No Turning Back</a:t>
-            </a:r>
+              <a:t>2.</a:t>
+            </a:r>
+            <a:r>
+              <a:rPr lang="en-US" altLang="en-US" sz="2400" dirty="0">
+                <a:sym typeface="+mn-ea"/>
+                <a:hlinkClick r:id="rId3"/>
+              </a:rPr>
+              <a:t>No Turning Back</a:t>
+            </a:r>
+            <a:endParaRPr lang="en-US" altLang="en-US" sz="2400" dirty="0">
+              <a:sym typeface="+mn-ea"/>
+            </a:endParaRPr>
           </a:p>
           <a:p>
             <a:pPr marL="635" indent="-635">
@@ -7647,6 +7827,58 @@
               </a:rPr>
               <a:t>         Christian Kids</a:t>
             </a:r>
+          </a:p>
+          <a:p>
+            <a:pPr marL="915035" indent="-915035" algn="l">
+              <a:buNone/>
+            </a:pPr>
+            <a:endParaRPr lang="en-US" altLang="en-US" sz="2400" dirty="0">
+              <a:sym typeface="+mn-ea"/>
+            </a:endParaRPr>
+          </a:p>
+          <a:p>
+            <a:pPr marL="915035" indent="-915035" algn="l">
+              <a:buNone/>
+            </a:pPr>
+            <a:r>
+              <a:rPr lang="en-US" altLang="en-US" sz="2400" dirty="0">
+                <a:sym typeface="+mn-ea"/>
+              </a:rPr>
+              <a:t>3. </a:t>
+            </a:r>
+            <a:r>
+              <a:rPr lang="en-US" altLang="en-US" sz="2400" dirty="0">
+                <a:sym typeface="+mn-ea"/>
+                <a:hlinkClick r:id="rId4"/>
+              </a:rPr>
+              <a:t>Moses &amp; Burning Bush</a:t>
+            </a:r>
+            <a:endParaRPr lang="en-US" altLang="en-US" sz="2400" dirty="0">
+              <a:sym typeface="+mn-ea"/>
+            </a:endParaRPr>
+          </a:p>
+          <a:p>
+            <a:pPr marL="915035" indent="-915035" algn="l">
+              <a:buNone/>
+            </a:pPr>
+            <a:r>
+              <a:rPr lang="en-US" altLang="en-US" sz="2400" dirty="0">
+                <a:sym typeface="+mn-ea"/>
+                <a:hlinkClick r:id="rId4"/>
+              </a:rPr>
+              <a:t>https://mail.google.com/mail/u/0/?tab=rm&amp;ogbl#inbox/FMfcgzQcpKXrBKJcKdcTdfTGNdJsTXWQ?projector=1</a:t>
+            </a:r>
+            <a:endParaRPr lang="en-US" altLang="en-US" sz="2400" dirty="0">
+              <a:sym typeface="+mn-ea"/>
+            </a:endParaRPr>
+          </a:p>
+          <a:p>
+            <a:pPr marL="915035" indent="-915035" algn="l">
+              <a:buNone/>
+            </a:pPr>
+            <a:endParaRPr lang="en-US" altLang="en-US" sz="2400" dirty="0">
+              <a:sym typeface="+mn-ea"/>
+            </a:endParaRPr>
           </a:p>
         </p:txBody>
       </p:sp>
@@ -7679,7 +7911,7 @@
               <a:rPr lang="en-US" altLang="en-US" sz="2000" dirty="0">
                 <a:sym typeface="+mn-ea"/>
               </a:rPr>
-              <a:t>3</a:t>
+              <a:t>4</a:t>
             </a:r>
             <a:r>
               <a:rPr lang="en-US" altLang="en-US" sz="2400" dirty="0">
@@ -7702,7 +7934,7 @@
                   <a:srgbClr val="00B050"/>
                 </a:solidFill>
                 <a:sym typeface="+mn-ea"/>
-                <a:hlinkClick r:id="rId3"/>
+                <a:hlinkClick r:id="rId5"/>
               </a:rPr>
               <a:t>https://www.youtube.com/watch?v=a-wWKL-7Mrg</a:t>
             </a:r>
@@ -7756,13 +7988,20 @@
           <a:p>
             <a:r>
               <a:rPr lang="en-US" dirty="0"/>
-              <a:t>1. Here I am.</a:t>
-            </a:r>
-          </a:p>
-          <a:p>
+              <a:t>1. </a:t>
+            </a:r>
             <a:r>
               <a:rPr lang="en-US" dirty="0">
-                <a:hlinkClick r:id="rId4"/>
+                <a:hlinkClick r:id="rId6"/>
+              </a:rPr>
+              <a:t>Here I am. (Kids)</a:t>
+            </a:r>
+            <a:endParaRPr lang="en-US" dirty="0"/>
+          </a:p>
+          <a:p>
+            <a:r>
+              <a:rPr lang="en-US" dirty="0">
+                <a:hlinkClick r:id="rId6"/>
               </a:rPr>
               <a:t>https://www.youtube.com/watch?v=03G52K9X2hQ&amp;list=RD03G52K9X2hQ&amp;start_radio=1&amp;ab_channel=Maranatha%21Music</a:t>
             </a:r>

</xml_diff>